<commit_message>
fixed fonts in video pipeline diagrams
</commit_message>
<xml_diff>
--- a/video-pipeline-hardware.pptx
+++ b/video-pipeline-hardware.pptx
@@ -3341,7 +3341,7 @@
         <p:spPr>
           <a:xfrm>
             <a:off x="7100682" y="657213"/>
-            <a:ext cx="1764791" cy="307777"/>
+            <a:ext cx="1764791" cy="276999"/>
           </a:xfrm>
           <a:prstGeom prst="rect">
             <a:avLst/>
@@ -3363,7 +3363,7 @@
           <a:p>
             <a:pPr algn="ctr"/>
             <a:r>
-              <a:rPr lang="en-US" sz="1400" dirty="0"/>
+              <a:rPr lang="en-US" sz="1200" dirty="0"/>
               <a:t>Proprietary cables</a:t>
             </a:r>
           </a:p>
@@ -3384,7 +3384,7 @@
         <p:spPr>
           <a:xfrm>
             <a:off x="4572000" y="1075728"/>
-            <a:ext cx="1338162" cy="307777"/>
+            <a:ext cx="1338162" cy="276999"/>
           </a:xfrm>
           <a:prstGeom prst="rect">
             <a:avLst/>
@@ -3409,7 +3409,7 @@
           <a:p>
             <a:pPr algn="ctr"/>
             <a:r>
-              <a:rPr lang="en-US" sz="1400" dirty="0"/>
+              <a:rPr lang="en-US" sz="1200" dirty="0"/>
               <a:t>Left CCU</a:t>
             </a:r>
           </a:p>
@@ -3430,7 +3430,7 @@
         <p:spPr>
           <a:xfrm>
             <a:off x="6281062" y="1075728"/>
-            <a:ext cx="1338162" cy="307777"/>
+            <a:ext cx="1338162" cy="276999"/>
           </a:xfrm>
           <a:prstGeom prst="rect">
             <a:avLst/>
@@ -3455,7 +3455,7 @@
           <a:p>
             <a:pPr algn="ctr"/>
             <a:r>
-              <a:rPr lang="en-US" sz="1400" dirty="0"/>
+              <a:rPr lang="en-US" sz="1200" dirty="0"/>
               <a:t>Right CCU</a:t>
             </a:r>
           </a:p>
@@ -3476,7 +3476,7 @@
         <p:spPr>
           <a:xfrm>
             <a:off x="5584371" y="238702"/>
-            <a:ext cx="1023258" cy="307777"/>
+            <a:ext cx="1023258" cy="276999"/>
           </a:xfrm>
           <a:prstGeom prst="rect">
             <a:avLst/>
@@ -3501,7 +3501,7 @@
           <a:p>
             <a:pPr algn="ctr"/>
             <a:r>
-              <a:rPr lang="en-US" sz="1400" dirty="0"/>
+              <a:rPr lang="en-US" sz="1200" dirty="0"/>
               <a:t>Cameras</a:t>
             </a:r>
           </a:p>
@@ -3525,8 +3525,8 @@
         </p:nvCxnSpPr>
         <p:spPr>
           <a:xfrm rot="5400000">
-            <a:off x="5403917" y="383644"/>
-            <a:ext cx="529249" cy="854919"/>
+            <a:off x="5388528" y="368255"/>
+            <a:ext cx="560027" cy="854919"/>
           </a:xfrm>
           <a:prstGeom prst="curvedConnector3">
             <a:avLst>
@@ -3573,8 +3573,8 @@
         </p:nvCxnSpPr>
         <p:spPr>
           <a:xfrm rot="16200000" flipH="1">
-            <a:off x="6258447" y="384031"/>
-            <a:ext cx="529249" cy="854143"/>
+            <a:off x="6243058" y="368642"/>
+            <a:ext cx="560027" cy="854143"/>
           </a:xfrm>
           <a:prstGeom prst="curvedConnector3">
             <a:avLst>
@@ -3618,7 +3618,7 @@
         <p:spPr>
           <a:xfrm>
             <a:off x="4572000" y="1912754"/>
-            <a:ext cx="1338940" cy="738664"/>
+            <a:ext cx="1338940" cy="646331"/>
           </a:xfrm>
           <a:prstGeom prst="rect">
             <a:avLst/>
@@ -3643,25 +3643,25 @@
           <a:p>
             <a:pPr algn="ctr"/>
             <a:r>
-              <a:rPr lang="en-US" sz="1400" dirty="0"/>
+              <a:rPr lang="en-US" sz="1200" dirty="0"/>
               <a:t>Left Converter</a:t>
             </a:r>
           </a:p>
           <a:p>
             <a:pPr algn="ctr"/>
             <a:r>
-              <a:rPr lang="en-US" sz="1400" dirty="0"/>
+              <a:rPr lang="en-US" sz="1200" dirty="0"/>
               <a:t>SDI to VGA </a:t>
             </a:r>
             <a:r>
-              <a:rPr lang="en-US" sz="1400" i="1" dirty="0"/>
+              <a:rPr lang="en-US" sz="1200" i="1" dirty="0"/>
               <a:t>or</a:t>
             </a:r>
           </a:p>
           <a:p>
             <a:pPr algn="ctr"/>
             <a:r>
-              <a:rPr lang="en-US" sz="1400" dirty="0"/>
+              <a:rPr lang="en-US" sz="1200" dirty="0"/>
               <a:t>S-Video to VGA</a:t>
             </a:r>
           </a:p>
@@ -3682,7 +3682,7 @@
         <p:spPr>
           <a:xfrm>
             <a:off x="6281062" y="1912754"/>
-            <a:ext cx="1338940" cy="738664"/>
+            <a:ext cx="1338940" cy="646331"/>
           </a:xfrm>
           <a:prstGeom prst="rect">
             <a:avLst/>
@@ -3707,25 +3707,25 @@
           <a:p>
             <a:pPr algn="ctr"/>
             <a:r>
-              <a:rPr lang="en-US" sz="1400" dirty="0"/>
+              <a:rPr lang="en-US" sz="1200" dirty="0"/>
               <a:t>Right Converter</a:t>
             </a:r>
           </a:p>
           <a:p>
             <a:pPr algn="ctr"/>
             <a:r>
-              <a:rPr lang="en-US" sz="1400" dirty="0"/>
+              <a:rPr lang="en-US" sz="1200" dirty="0"/>
               <a:t>SDI to VGA </a:t>
             </a:r>
             <a:r>
-              <a:rPr lang="en-US" sz="1400" i="1" dirty="0"/>
+              <a:rPr lang="en-US" sz="1200" i="1" dirty="0"/>
               <a:t>or</a:t>
             </a:r>
           </a:p>
           <a:p>
             <a:pPr algn="ctr"/>
             <a:r>
-              <a:rPr lang="en-US" sz="1400" dirty="0"/>
+              <a:rPr lang="en-US" sz="1200" dirty="0"/>
               <a:t>S-Video to VGA</a:t>
             </a:r>
           </a:p>
@@ -3746,7 +3746,7 @@
         <p:spPr>
           <a:xfrm>
             <a:off x="7142722" y="1494239"/>
-            <a:ext cx="1722754" cy="307777"/>
+            <a:ext cx="1722754" cy="276999"/>
           </a:xfrm>
           <a:prstGeom prst="rect">
             <a:avLst/>
@@ -3768,7 +3768,7 @@
           <a:p>
             <a:pPr algn="ctr"/>
             <a:r>
-              <a:rPr lang="en-US" sz="1400" dirty="0"/>
+              <a:rPr lang="en-US" sz="1200" dirty="0"/>
               <a:t>Standard cables</a:t>
             </a:r>
           </a:p>
@@ -3789,7 +3789,7 @@
         <p:spPr>
           <a:xfrm>
             <a:off x="6280284" y="3180667"/>
-            <a:ext cx="1338940" cy="307777"/>
+            <a:ext cx="1338940" cy="276999"/>
           </a:xfrm>
           <a:prstGeom prst="rect">
             <a:avLst/>
@@ -3814,7 +3814,7 @@
           <a:p>
             <a:pPr algn="ctr"/>
             <a:r>
-              <a:rPr lang="en-US" sz="1400" dirty="0"/>
+              <a:rPr lang="en-US" sz="1200" dirty="0"/>
               <a:t>Right Monitor</a:t>
             </a:r>
           </a:p>
@@ -3835,7 +3835,7 @@
         <p:spPr>
           <a:xfrm>
             <a:off x="4571999" y="3204463"/>
-            <a:ext cx="1338940" cy="307777"/>
+            <a:ext cx="1338940" cy="276999"/>
           </a:xfrm>
           <a:prstGeom prst="rect">
             <a:avLst/>
@@ -3860,7 +3860,7 @@
           <a:p>
             <a:pPr algn="ctr"/>
             <a:r>
-              <a:rPr lang="en-US" sz="1400" dirty="0"/>
+              <a:rPr lang="en-US" sz="1200" dirty="0"/>
               <a:t>Left Monitor</a:t>
             </a:r>
           </a:p>
@@ -3881,7 +3881,7 @@
         <p:spPr>
           <a:xfrm>
             <a:off x="7142721" y="2762154"/>
-            <a:ext cx="1722753" cy="307777"/>
+            <a:ext cx="1722753" cy="276999"/>
           </a:xfrm>
           <a:prstGeom prst="rect">
             <a:avLst/>
@@ -3903,7 +3903,7 @@
           <a:p>
             <a:pPr algn="ctr"/>
             <a:r>
-              <a:rPr lang="en-US" sz="1400" dirty="0"/>
+              <a:rPr lang="en-US" sz="1200" dirty="0"/>
               <a:t>VGA cables</a:t>
             </a:r>
           </a:p>
@@ -3927,8 +3927,8 @@
         </p:nvCxnSpPr>
         <p:spPr>
           <a:xfrm rot="16200000" flipH="1">
-            <a:off x="4976651" y="1647934"/>
-            <a:ext cx="529249" cy="389"/>
+            <a:off x="4961262" y="1632545"/>
+            <a:ext cx="560027" cy="389"/>
           </a:xfrm>
           <a:prstGeom prst="curvedConnector3">
             <a:avLst/>
@@ -3970,8 +3970,8 @@
         </p:nvCxnSpPr>
         <p:spPr>
           <a:xfrm rot="16200000" flipH="1">
-            <a:off x="6685713" y="1647934"/>
-            <a:ext cx="529249" cy="389"/>
+            <a:off x="6670324" y="1632545"/>
+            <a:ext cx="560027" cy="389"/>
           </a:xfrm>
           <a:prstGeom prst="curvedConnector3">
             <a:avLst>
@@ -4015,8 +4015,8 @@
         </p:nvCxnSpPr>
         <p:spPr>
           <a:xfrm rot="5400000">
-            <a:off x="4964948" y="2927940"/>
-            <a:ext cx="553045" cy="1"/>
+            <a:off x="4918781" y="2881774"/>
+            <a:ext cx="645378" cy="1"/>
           </a:xfrm>
           <a:prstGeom prst="curvedConnector3">
             <a:avLst>
@@ -4060,8 +4060,8 @@
         </p:nvCxnSpPr>
         <p:spPr>
           <a:xfrm rot="5400000">
-            <a:off x="6685519" y="2915653"/>
-            <a:ext cx="529249" cy="778"/>
+            <a:off x="6639352" y="2869487"/>
+            <a:ext cx="621582" cy="778"/>
           </a:xfrm>
           <a:prstGeom prst="curvedConnector3">
             <a:avLst>

</xml_diff>